<commit_message>
updated heatmaps in powerpoint
</commit_message>
<xml_diff>
--- a/SSU11755_RNAseqsummary.pptx
+++ b/SSU11755_RNAseqsummary.pptx
@@ -3757,15 +3757,7 @@
           <a:p>
             <a:r>
               <a:rPr lang="en-US" dirty="0" smtClean="0"/>
-              <a:t> 1x10^6 vs </a:t>
-            </a:r>
-            <a:r>
-              <a:rPr lang="en-US" dirty="0" smtClean="0"/>
-              <a:t>Naïve </a:t>
-            </a:r>
-            <a:r>
-              <a:rPr lang="en-US" dirty="0" smtClean="0"/>
-              <a:t>: </a:t>
+              <a:t> 1x10^6 vs Naïve : </a:t>
             </a:r>
             <a:r>
               <a:rPr lang="en-US" dirty="0"/>
@@ -3876,7 +3868,7 @@
       </p:sp>
       <p:pic>
         <p:nvPicPr>
-          <p:cNvPr id="4" name="Picture 3"/>
+          <p:cNvPr id="3" name="Picture 2"/>
           <p:cNvPicPr>
             <a:picLocks noChangeAspect="1"/>
           </p:cNvPicPr>
@@ -3896,8 +3888,8 @@
         </p:blipFill>
         <p:spPr>
           <a:xfrm>
-            <a:off x="6421120" y="1455079"/>
-            <a:ext cx="5577840" cy="4780322"/>
+            <a:off x="5394960" y="1455079"/>
+            <a:ext cx="6797040" cy="4952604"/>
           </a:xfrm>
           <a:prstGeom prst="rect">
             <a:avLst/>
@@ -4324,11 +4316,7 @@
           <a:p>
             <a:r>
               <a:rPr lang="en-US" dirty="0" smtClean="0"/>
-              <a:t>1x10^9</a:t>
-            </a:r>
-            <a:r>
-              <a:rPr lang="en-US" dirty="0" smtClean="0"/>
-              <a:t> </a:t>
+              <a:t>1x10^9 </a:t>
             </a:r>
             <a:r>
               <a:rPr lang="en-US" dirty="0"/>
@@ -4447,7 +4435,7 @@
       </p:sp>
       <p:pic>
         <p:nvPicPr>
-          <p:cNvPr id="4" name="Picture 3"/>
+          <p:cNvPr id="3" name="Picture 2"/>
           <p:cNvPicPr>
             <a:picLocks noChangeAspect="1"/>
           </p:cNvPicPr>
@@ -4467,8 +4455,8 @@
         </p:blipFill>
         <p:spPr>
           <a:xfrm>
-            <a:off x="6096000" y="1284288"/>
-            <a:ext cx="6029393" cy="5167312"/>
+            <a:off x="5565183" y="1365754"/>
+            <a:ext cx="6626817" cy="5106165"/>
           </a:xfrm>
           <a:prstGeom prst="rect">
             <a:avLst/>
@@ -5163,11 +5151,7 @@
           <a:p>
             <a:r>
               <a:rPr lang="en-US" dirty="0" smtClean="0"/>
-              <a:t>1x10^9</a:t>
-            </a:r>
-            <a:r>
-              <a:rPr lang="en-US" dirty="0" smtClean="0"/>
-              <a:t> </a:t>
+              <a:t>1x10^9 </a:t>
             </a:r>
             <a:r>
               <a:rPr lang="en-US" dirty="0"/>
@@ -5286,7 +5270,7 @@
       </p:sp>
       <p:pic>
         <p:nvPicPr>
-          <p:cNvPr id="4" name="Picture 3"/>
+          <p:cNvPr id="3" name="Picture 2"/>
           <p:cNvPicPr>
             <a:picLocks noChangeAspect="1"/>
           </p:cNvPicPr>
@@ -5306,8 +5290,8 @@
         </p:blipFill>
         <p:spPr>
           <a:xfrm>
-            <a:off x="6259578" y="1757043"/>
-            <a:ext cx="5513365" cy="4725066"/>
+            <a:off x="5565183" y="1676515"/>
+            <a:ext cx="6403131" cy="4665586"/>
           </a:xfrm>
           <a:prstGeom prst="rect">
             <a:avLst/>

</xml_diff>